<commit_message>
Created line graph figures with v3 of data
Former-commit-id: df8ced7834c1cdfe8c97344aea3d781b6f01361d
</commit_message>
<xml_diff>
--- a/presentations/20200429.pptx
+++ b/presentations/20200429.pptx
@@ -5,9 +5,8 @@
     <p:sldMasterId id="2147483648" r:id="rId1"/>
   </p:sldMasterIdLst>
   <p:sldIdLst>
-    <p:sldId id="256" r:id="rId2"/>
-    <p:sldId id="257" r:id="rId3"/>
-    <p:sldId id="258" r:id="rId4"/>
+    <p:sldId id="258" r:id="rId2"/>
+    <p:sldId id="259" r:id="rId3"/>
   </p:sldIdLst>
   <p:sldSz cx="12192000" cy="6858000"/>
   <p:notesSz cx="6858000" cy="9144000"/>
@@ -3341,10 +3340,10 @@
       </p:grpSpPr>
       <p:pic>
         <p:nvPicPr>
-          <p:cNvPr id="5" name="Picture 4" descr="A screenshot of a cell phone&#10;&#10;Description automatically generated">
-            <a:extLst>
-              <a:ext uri="{FF2B5EF4-FFF2-40B4-BE49-F238E27FC236}">
-                <a16:creationId xmlns:a16="http://schemas.microsoft.com/office/drawing/2014/main" id="{3B4989C6-6120-4750-8199-ABF6FF5194DD}"/>
+          <p:cNvPr id="5" name="Picture 4" descr="A close up of a map&#10;&#10;Description automatically generated">
+            <a:extLst>
+              <a:ext uri="{FF2B5EF4-FFF2-40B4-BE49-F238E27FC236}">
+                <a16:creationId xmlns:a16="http://schemas.microsoft.com/office/drawing/2014/main" id="{88540BAA-FACF-4ADD-82DE-2C6B113D60A0}"/>
               </a:ext>
             </a:extLst>
           </p:cNvPr>
@@ -3367,8 +3366,8 @@
         </p:blipFill>
         <p:spPr>
           <a:xfrm>
-            <a:off x="263384" y="953529"/>
-            <a:ext cx="5832616" cy="4950941"/>
+            <a:off x="0" y="1635553"/>
+            <a:ext cx="4069346" cy="3595307"/>
           </a:xfrm>
           <a:prstGeom prst="rect">
             <a:avLst/>
@@ -3377,10 +3376,10 @@
       </p:pic>
       <p:pic>
         <p:nvPicPr>
-          <p:cNvPr id="7" name="Picture 6" descr="A screenshot of a cell phone&#10;&#10;Description automatically generated">
-            <a:extLst>
-              <a:ext uri="{FF2B5EF4-FFF2-40B4-BE49-F238E27FC236}">
-                <a16:creationId xmlns:a16="http://schemas.microsoft.com/office/drawing/2014/main" id="{D68C685F-038F-415B-9EA1-CFCC2BAAD13A}"/>
+          <p:cNvPr id="7" name="Picture 6" descr="A close up of a map&#10;&#10;Description automatically generated">
+            <a:extLst>
+              <a:ext uri="{FF2B5EF4-FFF2-40B4-BE49-F238E27FC236}">
+                <a16:creationId xmlns:a16="http://schemas.microsoft.com/office/drawing/2014/main" id="{448649CB-86BE-43C9-889E-CDD5900DDFA9}"/>
               </a:ext>
             </a:extLst>
           </p:cNvPr>
@@ -3403,8 +3402,44 @@
         </p:blipFill>
         <p:spPr>
           <a:xfrm>
-            <a:off x="6095999" y="953528"/>
-            <a:ext cx="5832616" cy="4950941"/>
+            <a:off x="4076274" y="1635553"/>
+            <a:ext cx="4069346" cy="3595307"/>
+          </a:xfrm>
+          <a:prstGeom prst="rect">
+            <a:avLst/>
+          </a:prstGeom>
+        </p:spPr>
+      </p:pic>
+      <p:pic>
+        <p:nvPicPr>
+          <p:cNvPr id="9" name="Picture 8" descr="A close up of a map&#10;&#10;Description automatically generated">
+            <a:extLst>
+              <a:ext uri="{FF2B5EF4-FFF2-40B4-BE49-F238E27FC236}">
+                <a16:creationId xmlns:a16="http://schemas.microsoft.com/office/drawing/2014/main" id="{30C0E455-B88E-44F7-9060-B2B483CC7E57}"/>
+              </a:ext>
+            </a:extLst>
+          </p:cNvPr>
+          <p:cNvPicPr>
+            <a:picLocks noChangeAspect="1"/>
+          </p:cNvPicPr>
+          <p:nvPr/>
+        </p:nvPicPr>
+        <p:blipFill>
+          <a:blip r:embed="rId4">
+            <a:extLst>
+              <a:ext uri="{28A0092B-C50C-407E-A947-70E740481C1C}">
+                <a14:useLocalDpi xmlns:a14="http://schemas.microsoft.com/office/drawing/2010/main" val="0"/>
+              </a:ext>
+            </a:extLst>
+          </a:blip>
+          <a:stretch>
+            <a:fillRect/>
+          </a:stretch>
+        </p:blipFill>
+        <p:spPr>
+          <a:xfrm>
+            <a:off x="8115725" y="1635553"/>
+            <a:ext cx="4069346" cy="3595307"/>
           </a:xfrm>
           <a:prstGeom prst="rect">
             <a:avLst/>
@@ -3414,7 +3449,7 @@
     </p:spTree>
     <p:extLst>
       <p:ext uri="{BB962C8B-B14F-4D97-AF65-F5344CB8AC3E}">
-        <p14:creationId xmlns:p14="http://schemas.microsoft.com/office/powerpoint/2010/main" val="3174881131"/>
+        <p14:creationId xmlns:p14="http://schemas.microsoft.com/office/powerpoint/2010/main" val="3130745174"/>
       </p:ext>
     </p:extLst>
   </p:cSld>
@@ -3443,180 +3478,10 @@
       </p:grpSpPr>
       <p:pic>
         <p:nvPicPr>
-          <p:cNvPr id="5" name="Picture 4" descr="A picture containing sitting, laptop, black, light&#10;&#10;Description automatically generated">
-            <a:extLst>
-              <a:ext uri="{FF2B5EF4-FFF2-40B4-BE49-F238E27FC236}">
-                <a16:creationId xmlns:a16="http://schemas.microsoft.com/office/drawing/2014/main" id="{2F5D28FD-A185-450A-80C8-16F5DC81DBF3}"/>
-              </a:ext>
-            </a:extLst>
-          </p:cNvPr>
-          <p:cNvPicPr>
-            <a:picLocks noChangeAspect="1"/>
-          </p:cNvPicPr>
-          <p:nvPr/>
-        </p:nvPicPr>
-        <p:blipFill rotWithShape="1">
-          <a:blip r:embed="rId2">
-            <a:extLst>
-              <a:ext uri="{28A0092B-C50C-407E-A947-70E740481C1C}">
-                <a14:useLocalDpi xmlns:a14="http://schemas.microsoft.com/office/drawing/2010/main" val="0"/>
-              </a:ext>
-            </a:extLst>
-          </a:blip>
-          <a:srcRect l="20401" t="30694" r="75926" b="64445"/>
-          <a:stretch/>
-        </p:blipFill>
-        <p:spPr>
-          <a:xfrm>
-            <a:off x="2758620" y="1845628"/>
-            <a:ext cx="3070680" cy="2709432"/>
-          </a:xfrm>
-          <a:prstGeom prst="rect">
-            <a:avLst/>
-          </a:prstGeom>
-        </p:spPr>
-      </p:pic>
-      <p:pic>
-        <p:nvPicPr>
-          <p:cNvPr id="7" name="Picture 6" descr="A picture containing laptop, flying, kite, fireworks&#10;&#10;Description automatically generated">
-            <a:extLst>
-              <a:ext uri="{FF2B5EF4-FFF2-40B4-BE49-F238E27FC236}">
-                <a16:creationId xmlns:a16="http://schemas.microsoft.com/office/drawing/2014/main" id="{AA179A4A-FE80-4DFA-8A33-068EF6F1103C}"/>
-              </a:ext>
-            </a:extLst>
-          </p:cNvPr>
-          <p:cNvPicPr>
-            <a:picLocks noChangeAspect="1"/>
-          </p:cNvPicPr>
-          <p:nvPr/>
-        </p:nvPicPr>
-        <p:blipFill rotWithShape="1">
-          <a:blip r:embed="rId3">
-            <a:extLst>
-              <a:ext uri="{28A0092B-C50C-407E-A947-70E740481C1C}">
-                <a14:useLocalDpi xmlns:a14="http://schemas.microsoft.com/office/drawing/2010/main" val="0"/>
-              </a:ext>
-            </a:extLst>
-          </a:blip>
-          <a:srcRect l="52909" t="20342" r="42507" b="73938"/>
-          <a:stretch/>
-        </p:blipFill>
-        <p:spPr>
-          <a:xfrm rot="1255611">
-            <a:off x="6527408" y="1977555"/>
-            <a:ext cx="2939080" cy="2445578"/>
-          </a:xfrm>
-          <a:prstGeom prst="rect">
-            <a:avLst/>
-          </a:prstGeom>
-        </p:spPr>
-      </p:pic>
-      <p:sp>
-        <p:nvSpPr>
-          <p:cNvPr id="8" name="TextBox 7">
-            <a:extLst>
-              <a:ext uri="{FF2B5EF4-FFF2-40B4-BE49-F238E27FC236}">
-                <a16:creationId xmlns:a16="http://schemas.microsoft.com/office/drawing/2014/main" id="{EB8F35B1-7D4B-499A-8212-120264A0C92D}"/>
-              </a:ext>
-            </a:extLst>
-          </p:cNvPr>
-          <p:cNvSpPr txBox="1"/>
-          <p:nvPr/>
-        </p:nvSpPr>
-        <p:spPr>
-          <a:xfrm>
-            <a:off x="3158777" y="3822700"/>
-            <a:ext cx="2270365" cy="369332"/>
-          </a:xfrm>
-          <a:prstGeom prst="rect">
-            <a:avLst/>
-          </a:prstGeom>
-          <a:noFill/>
-        </p:spPr>
-        <p:txBody>
-          <a:bodyPr wrap="none" rtlCol="0">
-            <a:spAutoFit/>
-          </a:bodyPr>
-          <a:lstStyle/>
-          <a:p>
-            <a:r>
-              <a:rPr lang="en-US" dirty="0"/>
-              <a:t>Iceberg, control, day 1</a:t>
-            </a:r>
-          </a:p>
-        </p:txBody>
-      </p:sp>
-      <p:sp>
-        <p:nvSpPr>
-          <p:cNvPr id="9" name="TextBox 8">
-            <a:extLst>
-              <a:ext uri="{FF2B5EF4-FFF2-40B4-BE49-F238E27FC236}">
-                <a16:creationId xmlns:a16="http://schemas.microsoft.com/office/drawing/2014/main" id="{552BC0A1-CD87-4A15-9B92-D2FE3E163636}"/>
-              </a:ext>
-            </a:extLst>
-          </p:cNvPr>
-          <p:cNvSpPr txBox="1"/>
-          <p:nvPr/>
-        </p:nvSpPr>
-        <p:spPr>
-          <a:xfrm>
-            <a:off x="6994177" y="3822700"/>
-            <a:ext cx="2270365" cy="369332"/>
-          </a:xfrm>
-          <a:prstGeom prst="rect">
-            <a:avLst/>
-          </a:prstGeom>
-          <a:noFill/>
-        </p:spPr>
-        <p:txBody>
-          <a:bodyPr wrap="none" rtlCol="0">
-            <a:spAutoFit/>
-          </a:bodyPr>
-          <a:lstStyle/>
-          <a:p>
-            <a:r>
-              <a:rPr lang="en-US" dirty="0"/>
-              <a:t>Iceberg, control, day 5</a:t>
-            </a:r>
-          </a:p>
-        </p:txBody>
-      </p:sp>
-    </p:spTree>
-    <p:extLst>
-      <p:ext uri="{BB962C8B-B14F-4D97-AF65-F5344CB8AC3E}">
-        <p14:creationId xmlns:p14="http://schemas.microsoft.com/office/powerpoint/2010/main" val="660707475"/>
-      </p:ext>
-    </p:extLst>
-  </p:cSld>
-  <p:clrMapOvr>
-    <a:masterClrMapping/>
-  </p:clrMapOvr>
-</p:sld>
-</file>
-
-<file path=ppt/slides/slide3.xml><?xml version="1.0" encoding="utf-8"?>
-<p:sld xmlns:a="http://schemas.openxmlformats.org/drawingml/2006/main" xmlns:r="http://schemas.openxmlformats.org/officeDocument/2006/relationships" xmlns:p="http://schemas.openxmlformats.org/presentationml/2006/main">
-  <p:cSld>
-    <p:spTree>
-      <p:nvGrpSpPr>
-        <p:cNvPr id="1" name=""/>
-        <p:cNvGrpSpPr/>
-        <p:nvPr/>
-      </p:nvGrpSpPr>
-      <p:grpSpPr>
-        <a:xfrm>
-          <a:off x="0" y="0"/>
-          <a:ext cx="0" cy="0"/>
-          <a:chOff x="0" y="0"/>
-          <a:chExt cx="0" cy="0"/>
-        </a:xfrm>
-      </p:grpSpPr>
-      <p:pic>
-        <p:nvPicPr>
           <p:cNvPr id="5" name="Picture 4" descr="A close up of a map&#10;&#10;Description automatically generated">
             <a:extLst>
               <a:ext uri="{FF2B5EF4-FFF2-40B4-BE49-F238E27FC236}">
-                <a16:creationId xmlns:a16="http://schemas.microsoft.com/office/drawing/2014/main" id="{88540BAA-FACF-4ADD-82DE-2C6B113D60A0}"/>
+                <a16:creationId xmlns:a16="http://schemas.microsoft.com/office/drawing/2014/main" id="{D58D949D-9212-451C-A9AE-59FCB952AD95}"/>
               </a:ext>
             </a:extLst>
           </p:cNvPr>
@@ -3639,8 +3504,8 @@
         </p:blipFill>
         <p:spPr>
           <a:xfrm>
-            <a:off x="0" y="1644553"/>
-            <a:ext cx="4039451" cy="3568894"/>
+            <a:off x="0" y="1617506"/>
+            <a:ext cx="4100676" cy="3622987"/>
           </a:xfrm>
           <a:prstGeom prst="rect">
             <a:avLst/>
@@ -3652,7 +3517,7 @@
           <p:cNvPr id="7" name="Picture 6" descr="A close up of a map&#10;&#10;Description automatically generated">
             <a:extLst>
               <a:ext uri="{FF2B5EF4-FFF2-40B4-BE49-F238E27FC236}">
-                <a16:creationId xmlns:a16="http://schemas.microsoft.com/office/drawing/2014/main" id="{448649CB-86BE-43C9-889E-CDD5900DDFA9}"/>
+                <a16:creationId xmlns:a16="http://schemas.microsoft.com/office/drawing/2014/main" id="{BC97CAB2-013D-4A0D-9DE7-571B8D25ACE1}"/>
               </a:ext>
             </a:extLst>
           </p:cNvPr>
@@ -3675,8 +3540,8 @@
         </p:blipFill>
         <p:spPr>
           <a:xfrm>
-            <a:off x="4076274" y="1644553"/>
-            <a:ext cx="4039451" cy="3568894"/>
+            <a:off x="4047106" y="1617506"/>
+            <a:ext cx="4100676" cy="3622987"/>
           </a:xfrm>
           <a:prstGeom prst="rect">
             <a:avLst/>
@@ -3688,7 +3553,7 @@
           <p:cNvPr id="9" name="Picture 8" descr="A close up of a map&#10;&#10;Description automatically generated">
             <a:extLst>
               <a:ext uri="{FF2B5EF4-FFF2-40B4-BE49-F238E27FC236}">
-                <a16:creationId xmlns:a16="http://schemas.microsoft.com/office/drawing/2014/main" id="{30C0E455-B88E-44F7-9060-B2B483CC7E57}"/>
+                <a16:creationId xmlns:a16="http://schemas.microsoft.com/office/drawing/2014/main" id="{0BFBF73D-EB38-43E2-BEBE-AB7FE7CD7993}"/>
               </a:ext>
             </a:extLst>
           </p:cNvPr>
@@ -3711,8 +3576,8 @@
         </p:blipFill>
         <p:spPr>
           <a:xfrm>
-            <a:off x="8152549" y="1644553"/>
-            <a:ext cx="4039451" cy="3568894"/>
+            <a:off x="8094212" y="1617506"/>
+            <a:ext cx="4100676" cy="3622987"/>
           </a:xfrm>
           <a:prstGeom prst="rect">
             <a:avLst/>
@@ -3722,7 +3587,7 @@
     </p:spTree>
     <p:extLst>
       <p:ext uri="{BB962C8B-B14F-4D97-AF65-F5344CB8AC3E}">
-        <p14:creationId xmlns:p14="http://schemas.microsoft.com/office/powerpoint/2010/main" val="3130745174"/>
+        <p14:creationId xmlns:p14="http://schemas.microsoft.com/office/powerpoint/2010/main" val="2150224934"/>
       </p:ext>
     </p:extLst>
   </p:cSld>

</xml_diff>